<commit_message>
Move combination of customers and shopping list in enumeraiton class
</commit_message>
<xml_diff>
--- a/DM_PJ01_Counting.pptx
+++ b/DM_PJ01_Counting.pptx
@@ -6,10 +6,13 @@
   </p:sldMasterIdLst>
   <p:sldIdLst>
     <p:sldId id="256" r:id="rId2"/>
-    <p:sldId id="259" r:id="rId3"/>
-    <p:sldId id="257" r:id="rId4"/>
-    <p:sldId id="258" r:id="rId5"/>
-    <p:sldId id="260" r:id="rId6"/>
+    <p:sldId id="261" r:id="rId3"/>
+    <p:sldId id="259" r:id="rId4"/>
+    <p:sldId id="257" r:id="rId5"/>
+    <p:sldId id="258" r:id="rId6"/>
+    <p:sldId id="262" r:id="rId7"/>
+    <p:sldId id="263" r:id="rId8"/>
+    <p:sldId id="260" r:id="rId9"/>
   </p:sldIdLst>
   <p:sldSz cx="12192000" cy="6858000"/>
   <p:notesSz cx="6858000" cy="9144000"/>
@@ -247,7 +250,7 @@
           <a:p>
             <a:fld id="{E166214C-AC9D-4514-ABF6-A88893E4B5F5}" type="datetimeFigureOut">
               <a:rPr lang="zh-TW" altLang="en-US" smtClean="0"/>
-              <a:t>2015/4/9</a:t>
+              <a:t>2015/4/14</a:t>
             </a:fld>
             <a:endParaRPr lang="zh-TW" altLang="en-US"/>
           </a:p>
@@ -417,7 +420,7 @@
           <a:p>
             <a:fld id="{E166214C-AC9D-4514-ABF6-A88893E4B5F5}" type="datetimeFigureOut">
               <a:rPr lang="zh-TW" altLang="en-US" smtClean="0"/>
-              <a:t>2015/4/9</a:t>
+              <a:t>2015/4/14</a:t>
             </a:fld>
             <a:endParaRPr lang="zh-TW" altLang="en-US"/>
           </a:p>
@@ -597,7 +600,7 @@
           <a:p>
             <a:fld id="{E166214C-AC9D-4514-ABF6-A88893E4B5F5}" type="datetimeFigureOut">
               <a:rPr lang="zh-TW" altLang="en-US" smtClean="0"/>
-              <a:t>2015/4/9</a:t>
+              <a:t>2015/4/14</a:t>
             </a:fld>
             <a:endParaRPr lang="zh-TW" altLang="en-US"/>
           </a:p>
@@ -777,7 +780,7 @@
           <a:p>
             <a:fld id="{E166214C-AC9D-4514-ABF6-A88893E4B5F5}" type="datetimeFigureOut">
               <a:rPr lang="zh-TW" altLang="en-US" smtClean="0"/>
-              <a:t>2015/4/9</a:t>
+              <a:t>2015/4/14</a:t>
             </a:fld>
             <a:endParaRPr lang="zh-TW" altLang="en-US"/>
           </a:p>
@@ -1023,7 +1026,7 @@
           <a:p>
             <a:fld id="{E166214C-AC9D-4514-ABF6-A88893E4B5F5}" type="datetimeFigureOut">
               <a:rPr lang="zh-TW" altLang="en-US" smtClean="0"/>
-              <a:t>2015/4/9</a:t>
+              <a:t>2015/4/14</a:t>
             </a:fld>
             <a:endParaRPr lang="zh-TW" altLang="en-US"/>
           </a:p>
@@ -1255,7 +1258,7 @@
           <a:p>
             <a:fld id="{E166214C-AC9D-4514-ABF6-A88893E4B5F5}" type="datetimeFigureOut">
               <a:rPr lang="zh-TW" altLang="en-US" smtClean="0"/>
-              <a:t>2015/4/9</a:t>
+              <a:t>2015/4/14</a:t>
             </a:fld>
             <a:endParaRPr lang="zh-TW" altLang="en-US"/>
           </a:p>
@@ -1622,7 +1625,7 @@
           <a:p>
             <a:fld id="{E166214C-AC9D-4514-ABF6-A88893E4B5F5}" type="datetimeFigureOut">
               <a:rPr lang="zh-TW" altLang="en-US" smtClean="0"/>
-              <a:t>2015/4/9</a:t>
+              <a:t>2015/4/14</a:t>
             </a:fld>
             <a:endParaRPr lang="zh-TW" altLang="en-US"/>
           </a:p>
@@ -1740,7 +1743,7 @@
           <a:p>
             <a:fld id="{E166214C-AC9D-4514-ABF6-A88893E4B5F5}" type="datetimeFigureOut">
               <a:rPr lang="zh-TW" altLang="en-US" smtClean="0"/>
-              <a:t>2015/4/9</a:t>
+              <a:t>2015/4/14</a:t>
             </a:fld>
             <a:endParaRPr lang="zh-TW" altLang="en-US"/>
           </a:p>
@@ -1835,7 +1838,7 @@
           <a:p>
             <a:fld id="{E166214C-AC9D-4514-ABF6-A88893E4B5F5}" type="datetimeFigureOut">
               <a:rPr lang="zh-TW" altLang="en-US" smtClean="0"/>
-              <a:t>2015/4/9</a:t>
+              <a:t>2015/4/14</a:t>
             </a:fld>
             <a:endParaRPr lang="zh-TW" altLang="en-US"/>
           </a:p>
@@ -2112,7 +2115,7 @@
           <a:p>
             <a:fld id="{E166214C-AC9D-4514-ABF6-A88893E4B5F5}" type="datetimeFigureOut">
               <a:rPr lang="zh-TW" altLang="en-US" smtClean="0"/>
-              <a:t>2015/4/9</a:t>
+              <a:t>2015/4/14</a:t>
             </a:fld>
             <a:endParaRPr lang="zh-TW" altLang="en-US"/>
           </a:p>
@@ -2365,7 +2368,7 @@
           <a:p>
             <a:fld id="{E166214C-AC9D-4514-ABF6-A88893E4B5F5}" type="datetimeFigureOut">
               <a:rPr lang="zh-TW" altLang="en-US" smtClean="0"/>
-              <a:t>2015/4/9</a:t>
+              <a:t>2015/4/14</a:t>
             </a:fld>
             <a:endParaRPr lang="zh-TW" altLang="en-US"/>
           </a:p>
@@ -2578,7 +2581,7 @@
           <a:p>
             <a:fld id="{E166214C-AC9D-4514-ABF6-A88893E4B5F5}" type="datetimeFigureOut">
               <a:rPr lang="zh-TW" altLang="en-US" smtClean="0"/>
-              <a:t>2015/4/9</a:t>
+              <a:t>2015/4/14</a:t>
             </a:fld>
             <a:endParaRPr lang="zh-TW" altLang="en-US"/>
           </a:p>
@@ -3082,7 +3085,123 @@
           <a:p>
             <a:r>
               <a:rPr lang="en-US" altLang="zh-TW" dirty="0" smtClean="0"/>
-              <a:t>Flow diagram</a:t>
+              <a:t>Outline</a:t>
+            </a:r>
+            <a:endParaRPr lang="zh-TW" altLang="en-US" dirty="0"/>
+          </a:p>
+        </p:txBody>
+      </p:sp>
+      <p:sp>
+        <p:nvSpPr>
+          <p:cNvPr id="3" name="內容版面配置區 2"/>
+          <p:cNvSpPr>
+            <a:spLocks noGrp="1"/>
+          </p:cNvSpPr>
+          <p:nvPr>
+            <p:ph idx="1"/>
+          </p:nvPr>
+        </p:nvSpPr>
+        <p:spPr/>
+        <p:txBody>
+          <a:bodyPr/>
+          <a:lstStyle/>
+          <a:p>
+            <a:r>
+              <a:rPr lang="en-US" altLang="zh-TW" dirty="0" smtClean="0"/>
+              <a:t>Architecture</a:t>
+            </a:r>
+          </a:p>
+          <a:p>
+            <a:r>
+              <a:rPr lang="en-US" altLang="zh-TW" dirty="0"/>
+              <a:t>R</a:t>
+            </a:r>
+            <a:r>
+              <a:rPr lang="en-US" altLang="zh-TW" dirty="0" smtClean="0"/>
+              <a:t>obustness</a:t>
+            </a:r>
+          </a:p>
+          <a:p>
+            <a:r>
+              <a:rPr lang="en-US" altLang="zh-TW" dirty="0" smtClean="0"/>
+              <a:t>Extensibility</a:t>
+            </a:r>
+          </a:p>
+          <a:p>
+            <a:r>
+              <a:rPr lang="en-US" altLang="zh-TW" dirty="0" smtClean="0"/>
+              <a:t>Teaching assistance question</a:t>
+            </a:r>
+          </a:p>
+          <a:p>
+            <a:endParaRPr lang="en-US" altLang="zh-TW" dirty="0" smtClean="0"/>
+          </a:p>
+          <a:p>
+            <a:endParaRPr lang="zh-TW" altLang="en-US" dirty="0"/>
+          </a:p>
+        </p:txBody>
+      </p:sp>
+    </p:spTree>
+    <p:extLst>
+      <p:ext uri="{BB962C8B-B14F-4D97-AF65-F5344CB8AC3E}">
+        <p14:creationId xmlns:p14="http://schemas.microsoft.com/office/powerpoint/2010/main" val="1418508615"/>
+      </p:ext>
+    </p:extLst>
+  </p:cSld>
+  <p:clrMapOvr>
+    <a:masterClrMapping/>
+  </p:clrMapOvr>
+</p:sld>
+</file>
+
+<file path=ppt/slides/slide3.xml><?xml version="1.0" encoding="utf-8"?>
+<p:sld xmlns:a="http://schemas.openxmlformats.org/drawingml/2006/main" xmlns:r="http://schemas.openxmlformats.org/officeDocument/2006/relationships" xmlns:p="http://schemas.openxmlformats.org/presentationml/2006/main">
+  <p:cSld>
+    <p:spTree>
+      <p:nvGrpSpPr>
+        <p:cNvPr id="1" name=""/>
+        <p:cNvGrpSpPr/>
+        <p:nvPr/>
+      </p:nvGrpSpPr>
+      <p:grpSpPr>
+        <a:xfrm>
+          <a:off x="0" y="0"/>
+          <a:ext cx="0" cy="0"/>
+          <a:chOff x="0" y="0"/>
+          <a:chExt cx="0" cy="0"/>
+        </a:xfrm>
+      </p:grpSpPr>
+      <p:sp>
+        <p:nvSpPr>
+          <p:cNvPr id="2" name="標題 1"/>
+          <p:cNvSpPr>
+            <a:spLocks noGrp="1"/>
+          </p:cNvSpPr>
+          <p:nvPr>
+            <p:ph type="title"/>
+          </p:nvPr>
+        </p:nvSpPr>
+        <p:spPr/>
+        <p:txBody>
+          <a:bodyPr>
+            <a:normAutofit fontScale="90000"/>
+          </a:bodyPr>
+          <a:lstStyle/>
+          <a:p>
+            <a:r>
+              <a:rPr lang="en-US" altLang="zh-TW" dirty="0" smtClean="0"/>
+              <a:t>Architecture</a:t>
+            </a:r>
+            <a:br>
+              <a:rPr lang="en-US" altLang="zh-TW" dirty="0" smtClean="0"/>
+            </a:br>
+            <a:r>
+              <a:rPr lang="en-US" altLang="zh-TW" dirty="0" smtClean="0"/>
+              <a:t>Flow </a:t>
+            </a:r>
+            <a:r>
+              <a:rPr lang="en-US" altLang="zh-TW" dirty="0" smtClean="0"/>
+              <a:t>diagram</a:t>
             </a:r>
             <a:endParaRPr lang="zh-TW" altLang="en-US" dirty="0"/>
           </a:p>
@@ -3130,7 +3249,7 @@
 </p:sld>
 </file>
 
-<file path=ppt/slides/slide3.xml><?xml version="1.0" encoding="utf-8"?>
+<file path=ppt/slides/slide4.xml><?xml version="1.0" encoding="utf-8"?>
 <p:sld xmlns:a="http://schemas.openxmlformats.org/drawingml/2006/main" xmlns:r="http://schemas.openxmlformats.org/officeDocument/2006/relationships" xmlns:p="http://schemas.openxmlformats.org/presentationml/2006/main">
   <p:cSld>
     <p:spTree>
@@ -3163,8 +3282,12 @@
           <a:lstStyle/>
           <a:p>
             <a:r>
+              <a:rPr lang="en-US" altLang="zh-TW" dirty="0"/>
+              <a:t>Architecture Entity </a:t>
+            </a:r>
+            <a:r>
               <a:rPr lang="en-US" altLang="zh-TW" dirty="0" smtClean="0"/>
-              <a:t>Entity and shopping cart</a:t>
+              <a:t>and shopping cart</a:t>
             </a:r>
             <a:endParaRPr lang="zh-TW" altLang="en-US" dirty="0"/>
           </a:p>
@@ -3212,7 +3335,7 @@
 </p:sld>
 </file>
 
-<file path=ppt/slides/slide4.xml><?xml version="1.0" encoding="utf-8"?>
+<file path=ppt/slides/slide5.xml><?xml version="1.0" encoding="utf-8"?>
 <p:sld xmlns:a="http://schemas.openxmlformats.org/drawingml/2006/main" xmlns:r="http://schemas.openxmlformats.org/officeDocument/2006/relationships" xmlns:p="http://schemas.openxmlformats.org/presentationml/2006/main">
   <p:cSld>
     <p:spTree>
@@ -3245,8 +3368,8 @@
           <a:lstStyle/>
           <a:p>
             <a:r>
-              <a:rPr lang="en-US" altLang="zh-TW" dirty="0" smtClean="0"/>
-              <a:t>Console</a:t>
+              <a:rPr lang="en-US" altLang="zh-TW" dirty="0"/>
+              <a:t>Architecture Console</a:t>
             </a:r>
             <a:endParaRPr lang="zh-TW" altLang="en-US" dirty="0"/>
           </a:p>
@@ -3294,7 +3417,7 @@
 </p:sld>
 </file>
 
-<file path=ppt/slides/slide5.xml><?xml version="1.0" encoding="utf-8"?>
+<file path=ppt/slides/slide6.xml><?xml version="1.0" encoding="utf-8"?>
 <p:sld xmlns:a="http://schemas.openxmlformats.org/drawingml/2006/main" xmlns:r="http://schemas.openxmlformats.org/officeDocument/2006/relationships" xmlns:p="http://schemas.openxmlformats.org/presentationml/2006/main">
   <p:cSld>
     <p:spTree>
@@ -3327,6 +3450,318 @@
           <a:lstStyle/>
           <a:p>
             <a:r>
+              <a:rPr lang="en-US" altLang="zh-TW" dirty="0"/>
+              <a:t>Robustness</a:t>
+            </a:r>
+            <a:endParaRPr lang="zh-TW" altLang="en-US" dirty="0"/>
+          </a:p>
+        </p:txBody>
+      </p:sp>
+      <p:sp>
+        <p:nvSpPr>
+          <p:cNvPr id="3" name="內容版面配置區 2"/>
+          <p:cNvSpPr>
+            <a:spLocks noGrp="1"/>
+          </p:cNvSpPr>
+          <p:nvPr>
+            <p:ph idx="1"/>
+          </p:nvPr>
+        </p:nvSpPr>
+        <p:spPr/>
+        <p:txBody>
+          <a:bodyPr/>
+          <a:lstStyle/>
+          <a:p>
+            <a:r>
+              <a:rPr lang="en-US" altLang="zh-TW" dirty="0" smtClean="0"/>
+              <a:t>The validation of user input is done by checking if the numbers of product, customer, least count , and maximum count is valid.</a:t>
+            </a:r>
+          </a:p>
+          <a:p>
+            <a:r>
+              <a:rPr lang="en-US" altLang="zh-TW" dirty="0" smtClean="0"/>
+              <a:t>The system may be dead due to too great input, ex: product = 10, customer = 10, least count = 0, maximum = 10. This will cause the eclipse console to dead. But the result enumeration is finished.</a:t>
+            </a:r>
+            <a:endParaRPr lang="zh-TW" altLang="en-US" dirty="0"/>
+          </a:p>
+        </p:txBody>
+      </p:sp>
+    </p:spTree>
+    <p:extLst>
+      <p:ext uri="{BB962C8B-B14F-4D97-AF65-F5344CB8AC3E}">
+        <p14:creationId xmlns:p14="http://schemas.microsoft.com/office/powerpoint/2010/main" val="787537914"/>
+      </p:ext>
+    </p:extLst>
+  </p:cSld>
+  <p:clrMapOvr>
+    <a:masterClrMapping/>
+  </p:clrMapOvr>
+</p:sld>
+</file>
+
+<file path=ppt/slides/slide7.xml><?xml version="1.0" encoding="utf-8"?>
+<p:sld xmlns:a="http://schemas.openxmlformats.org/drawingml/2006/main" xmlns:r="http://schemas.openxmlformats.org/officeDocument/2006/relationships" xmlns:p="http://schemas.openxmlformats.org/presentationml/2006/main">
+  <p:cSld>
+    <p:spTree>
+      <p:nvGrpSpPr>
+        <p:cNvPr id="1" name=""/>
+        <p:cNvGrpSpPr/>
+        <p:nvPr/>
+      </p:nvGrpSpPr>
+      <p:grpSpPr>
+        <a:xfrm>
+          <a:off x="0" y="0"/>
+          <a:ext cx="0" cy="0"/>
+          <a:chOff x="0" y="0"/>
+          <a:chExt cx="0" cy="0"/>
+        </a:xfrm>
+      </p:grpSpPr>
+      <p:sp>
+        <p:nvSpPr>
+          <p:cNvPr id="2" name="標題 1"/>
+          <p:cNvSpPr>
+            <a:spLocks noGrp="1"/>
+          </p:cNvSpPr>
+          <p:nvPr>
+            <p:ph type="title"/>
+          </p:nvPr>
+        </p:nvSpPr>
+        <p:spPr/>
+        <p:txBody>
+          <a:bodyPr/>
+          <a:lstStyle/>
+          <a:p>
+            <a:r>
+              <a:rPr lang="en-US" altLang="zh-TW" dirty="0" smtClean="0"/>
+              <a:t>Extensibility</a:t>
+            </a:r>
+            <a:endParaRPr lang="zh-TW" altLang="en-US" dirty="0"/>
+          </a:p>
+        </p:txBody>
+      </p:sp>
+      <p:sp>
+        <p:nvSpPr>
+          <p:cNvPr id="3" name="內容版面配置區 2"/>
+          <p:cNvSpPr>
+            <a:spLocks noGrp="1"/>
+          </p:cNvSpPr>
+          <p:nvPr>
+            <p:ph idx="1"/>
+          </p:nvPr>
+        </p:nvSpPr>
+        <p:spPr/>
+        <p:txBody>
+          <a:bodyPr/>
+          <a:lstStyle/>
+          <a:p>
+            <a:r>
+              <a:rPr lang="en-US" altLang="zh-TW" dirty="0" smtClean="0"/>
+              <a:t>While the entity is initial by real data such as:</a:t>
+            </a:r>
+            <a:r>
+              <a:rPr lang="zh-TW" altLang="en-US" dirty="0"/>
+              <a:t> </a:t>
+            </a:r>
+            <a:endParaRPr lang="en-US" altLang="zh-TW" dirty="0" smtClean="0"/>
+          </a:p>
+          <a:p>
+            <a:r>
+              <a:rPr lang="en-US" altLang="zh-TW" dirty="0" smtClean="0"/>
+              <a:t>customer:</a:t>
+            </a:r>
+            <a:r>
+              <a:rPr lang="zh-TW" altLang="en-US" dirty="0"/>
+              <a:t>詹純</a:t>
+            </a:r>
+            <a:r>
+              <a:rPr lang="zh-TW" altLang="en-US" dirty="0" smtClean="0"/>
+              <a:t>妍</a:t>
+            </a:r>
+            <a:r>
+              <a:rPr lang="zh-TW" altLang="en-US" dirty="0"/>
+              <a:t>、</a:t>
+            </a:r>
+            <a:r>
+              <a:rPr lang="zh-TW" altLang="en-US" dirty="0" smtClean="0"/>
+              <a:t>孫惠祥、賴</a:t>
+            </a:r>
+            <a:r>
+              <a:rPr lang="zh-TW" altLang="en-US" dirty="0"/>
+              <a:t>剛</a:t>
+            </a:r>
+            <a:r>
+              <a:rPr lang="zh-TW" altLang="en-US" dirty="0" smtClean="0"/>
+              <a:t>萍、錢</a:t>
+            </a:r>
+            <a:r>
+              <a:rPr lang="zh-TW" altLang="en-US" dirty="0"/>
+              <a:t>巧</a:t>
+            </a:r>
+            <a:r>
+              <a:rPr lang="zh-TW" altLang="en-US" dirty="0" smtClean="0"/>
+              <a:t>馨</a:t>
+            </a:r>
+            <a:endParaRPr lang="en-US" altLang="zh-TW" dirty="0" smtClean="0"/>
+          </a:p>
+          <a:p>
+            <a:r>
+              <a:rPr lang="en-US" altLang="zh-TW" dirty="0" smtClean="0"/>
+              <a:t>product:</a:t>
+            </a:r>
+            <a:r>
+              <a:rPr lang="zh-TW" altLang="en-US" dirty="0"/>
+              <a:t>工業用谷氨酸	</a:t>
+            </a:r>
+            <a:r>
+              <a:rPr lang="zh-TW" altLang="en-US" dirty="0" smtClean="0"/>
+              <a:t>、木</a:t>
+            </a:r>
+            <a:r>
+              <a:rPr lang="zh-TW" altLang="en-US" dirty="0"/>
+              <a:t>醇蒸餾</a:t>
+            </a:r>
+            <a:r>
+              <a:rPr lang="zh-TW" altLang="en-US" dirty="0" smtClean="0"/>
+              <a:t>劑、氯化銨溶液</a:t>
+            </a:r>
+            <a:endParaRPr lang="en-US" altLang="zh-TW" dirty="0" smtClean="0"/>
+          </a:p>
+          <a:p>
+            <a:r>
+              <a:rPr lang="en-US" altLang="zh-TW" dirty="0" smtClean="0"/>
+              <a:t>In which resource can be found in the package of </a:t>
+            </a:r>
+            <a:r>
+              <a:rPr lang="en-US" altLang="zh-TW" dirty="0" err="1" smtClean="0"/>
+              <a:t>model.resource</a:t>
+            </a:r>
+            <a:endParaRPr lang="en-US" altLang="zh-TW" dirty="0" smtClean="0"/>
+          </a:p>
+          <a:p>
+            <a:r>
+              <a:rPr lang="en-US" altLang="zh-TW" dirty="0" smtClean="0"/>
+              <a:t>Future connecting to a database is possible because of the </a:t>
+            </a:r>
+            <a:r>
+              <a:rPr lang="en-US" altLang="zh-TW" dirty="0" err="1" smtClean="0"/>
+              <a:t>entitymanager</a:t>
+            </a:r>
+            <a:r>
+              <a:rPr lang="en-US" altLang="zh-TW" dirty="0" smtClean="0"/>
+              <a:t> design</a:t>
+            </a:r>
+          </a:p>
+          <a:p>
+            <a:endParaRPr lang="zh-TW" altLang="en-US" dirty="0"/>
+          </a:p>
+        </p:txBody>
+      </p:sp>
+      <p:pic>
+        <p:nvPicPr>
+          <p:cNvPr id="5" name="圖片 4" descr="畫面剪輯"/>
+          <p:cNvPicPr>
+            <a:picLocks noChangeAspect="1"/>
+          </p:cNvPicPr>
+          <p:nvPr/>
+        </p:nvPicPr>
+        <p:blipFill>
+          <a:blip r:embed="rId2">
+            <a:extLst>
+              <a:ext uri="{28A0092B-C50C-407E-A947-70E740481C1C}">
+                <a14:useLocalDpi xmlns:a14="http://schemas.microsoft.com/office/drawing/2010/main" val="0"/>
+              </a:ext>
+            </a:extLst>
+          </a:blip>
+          <a:stretch>
+            <a:fillRect/>
+          </a:stretch>
+        </p:blipFill>
+        <p:spPr>
+          <a:xfrm>
+            <a:off x="7695573" y="3702049"/>
+            <a:ext cx="4496427" cy="3162741"/>
+          </a:xfrm>
+          <a:prstGeom prst="rect">
+            <a:avLst/>
+          </a:prstGeom>
+        </p:spPr>
+      </p:pic>
+      <p:pic>
+        <p:nvPicPr>
+          <p:cNvPr id="6" name="圖片 5" descr="畫面剪輯"/>
+          <p:cNvPicPr>
+            <a:picLocks noChangeAspect="1"/>
+          </p:cNvPicPr>
+          <p:nvPr/>
+        </p:nvPicPr>
+        <p:blipFill>
+          <a:blip r:embed="rId3">
+            <a:extLst>
+              <a:ext uri="{28A0092B-C50C-407E-A947-70E740481C1C}">
+                <a14:useLocalDpi xmlns:a14="http://schemas.microsoft.com/office/drawing/2010/main" val="0"/>
+              </a:ext>
+            </a:extLst>
+          </a:blip>
+          <a:stretch>
+            <a:fillRect/>
+          </a:stretch>
+        </p:blipFill>
+        <p:spPr>
+          <a:xfrm>
+            <a:off x="0" y="3702049"/>
+            <a:ext cx="6925642" cy="1028844"/>
+          </a:xfrm>
+          <a:prstGeom prst="rect">
+            <a:avLst/>
+          </a:prstGeom>
+        </p:spPr>
+      </p:pic>
+    </p:spTree>
+    <p:extLst>
+      <p:ext uri="{BB962C8B-B14F-4D97-AF65-F5344CB8AC3E}">
+        <p14:creationId xmlns:p14="http://schemas.microsoft.com/office/powerpoint/2010/main" val="2425083137"/>
+      </p:ext>
+    </p:extLst>
+  </p:cSld>
+  <p:clrMapOvr>
+    <a:masterClrMapping/>
+  </p:clrMapOvr>
+</p:sld>
+</file>
+
+<file path=ppt/slides/slide8.xml><?xml version="1.0" encoding="utf-8"?>
+<p:sld xmlns:a="http://schemas.openxmlformats.org/drawingml/2006/main" xmlns:r="http://schemas.openxmlformats.org/officeDocument/2006/relationships" xmlns:p="http://schemas.openxmlformats.org/presentationml/2006/main">
+  <p:cSld>
+    <p:spTree>
+      <p:nvGrpSpPr>
+        <p:cNvPr id="1" name=""/>
+        <p:cNvGrpSpPr/>
+        <p:nvPr/>
+      </p:nvGrpSpPr>
+      <p:grpSpPr>
+        <a:xfrm>
+          <a:off x="0" y="0"/>
+          <a:ext cx="0" cy="0"/>
+          <a:chOff x="0" y="0"/>
+          <a:chExt cx="0" cy="0"/>
+        </a:xfrm>
+      </p:grpSpPr>
+      <p:sp>
+        <p:nvSpPr>
+          <p:cNvPr id="2" name="標題 1"/>
+          <p:cNvSpPr>
+            <a:spLocks noGrp="1"/>
+          </p:cNvSpPr>
+          <p:nvPr>
+            <p:ph type="title"/>
+          </p:nvPr>
+        </p:nvSpPr>
+        <p:spPr/>
+        <p:txBody>
+          <a:bodyPr/>
+          <a:lstStyle/>
+          <a:p>
+            <a:r>
               <a:rPr lang="en-US" altLang="zh-TW" dirty="0" smtClean="0"/>
               <a:t>Why 10 will be dead?</a:t>
             </a:r>
@@ -3351,13 +3786,8 @@
           <a:p>
             <a:r>
               <a:rPr lang="en-US" altLang="zh-TW" dirty="0" smtClean="0"/>
-              <a:t>In fact, the enumeration of 10, 10, 1, 10 is complete. Because the numbers of enumeration is calculated by the size of the result list. The console output is too slow. To show only the number of result is fast (after all enumerations has been </a:t>
-            </a:r>
-            <a:r>
-              <a:rPr lang="en-US" altLang="zh-TW" smtClean="0"/>
-              <a:t>done).</a:t>
-            </a:r>
-            <a:endParaRPr lang="en-US" altLang="zh-TW" dirty="0" smtClean="0"/>
+              <a:t>In fact, the enumeration of 10, 10, 1, 10 is complete. Because the numbers of enumeration is calculated by the size of the result list. The console output is too slow. To show only the number of result is fast (after all enumerations has been done).</a:t>
+            </a:r>
           </a:p>
           <a:p>
             <a:endParaRPr lang="zh-TW" altLang="en-US" dirty="0"/>
@@ -3386,8 +3816,8 @@
         </p:blipFill>
         <p:spPr>
           <a:xfrm>
-            <a:off x="6933063" y="3656909"/>
-            <a:ext cx="5258937" cy="3201091"/>
+            <a:off x="5252599" y="2634019"/>
+            <a:ext cx="6939401" cy="4223982"/>
           </a:xfrm>
           <a:prstGeom prst="rect">
             <a:avLst/>

</xml_diff>

<commit_message>
2015/5/14 Finish rule part, but ppt haven't finished
</commit_message>
<xml_diff>
--- a/DM_PJ01_Counting.pptx
+++ b/DM_PJ01_Counting.pptx
@@ -250,7 +250,7 @@
           <a:p>
             <a:fld id="{E166214C-AC9D-4514-ABF6-A88893E4B5F5}" type="datetimeFigureOut">
               <a:rPr lang="zh-TW" altLang="en-US" smtClean="0"/>
-              <a:t>2015/4/14</a:t>
+              <a:t>2015/5/13</a:t>
             </a:fld>
             <a:endParaRPr lang="zh-TW" altLang="en-US"/>
           </a:p>
@@ -420,7 +420,7 @@
           <a:p>
             <a:fld id="{E166214C-AC9D-4514-ABF6-A88893E4B5F5}" type="datetimeFigureOut">
               <a:rPr lang="zh-TW" altLang="en-US" smtClean="0"/>
-              <a:t>2015/4/14</a:t>
+              <a:t>2015/5/13</a:t>
             </a:fld>
             <a:endParaRPr lang="zh-TW" altLang="en-US"/>
           </a:p>
@@ -600,7 +600,7 @@
           <a:p>
             <a:fld id="{E166214C-AC9D-4514-ABF6-A88893E4B5F5}" type="datetimeFigureOut">
               <a:rPr lang="zh-TW" altLang="en-US" smtClean="0"/>
-              <a:t>2015/4/14</a:t>
+              <a:t>2015/5/13</a:t>
             </a:fld>
             <a:endParaRPr lang="zh-TW" altLang="en-US"/>
           </a:p>
@@ -780,7 +780,7 @@
           <a:p>
             <a:fld id="{E166214C-AC9D-4514-ABF6-A88893E4B5F5}" type="datetimeFigureOut">
               <a:rPr lang="zh-TW" altLang="en-US" smtClean="0"/>
-              <a:t>2015/4/14</a:t>
+              <a:t>2015/5/13</a:t>
             </a:fld>
             <a:endParaRPr lang="zh-TW" altLang="en-US"/>
           </a:p>
@@ -1026,7 +1026,7 @@
           <a:p>
             <a:fld id="{E166214C-AC9D-4514-ABF6-A88893E4B5F5}" type="datetimeFigureOut">
               <a:rPr lang="zh-TW" altLang="en-US" smtClean="0"/>
-              <a:t>2015/4/14</a:t>
+              <a:t>2015/5/13</a:t>
             </a:fld>
             <a:endParaRPr lang="zh-TW" altLang="en-US"/>
           </a:p>
@@ -1258,7 +1258,7 @@
           <a:p>
             <a:fld id="{E166214C-AC9D-4514-ABF6-A88893E4B5F5}" type="datetimeFigureOut">
               <a:rPr lang="zh-TW" altLang="en-US" smtClean="0"/>
-              <a:t>2015/4/14</a:t>
+              <a:t>2015/5/13</a:t>
             </a:fld>
             <a:endParaRPr lang="zh-TW" altLang="en-US"/>
           </a:p>
@@ -1625,7 +1625,7 @@
           <a:p>
             <a:fld id="{E166214C-AC9D-4514-ABF6-A88893E4B5F5}" type="datetimeFigureOut">
               <a:rPr lang="zh-TW" altLang="en-US" smtClean="0"/>
-              <a:t>2015/4/14</a:t>
+              <a:t>2015/5/13</a:t>
             </a:fld>
             <a:endParaRPr lang="zh-TW" altLang="en-US"/>
           </a:p>
@@ -1743,7 +1743,7 @@
           <a:p>
             <a:fld id="{E166214C-AC9D-4514-ABF6-A88893E4B5F5}" type="datetimeFigureOut">
               <a:rPr lang="zh-TW" altLang="en-US" smtClean="0"/>
-              <a:t>2015/4/14</a:t>
+              <a:t>2015/5/13</a:t>
             </a:fld>
             <a:endParaRPr lang="zh-TW" altLang="en-US"/>
           </a:p>
@@ -1838,7 +1838,7 @@
           <a:p>
             <a:fld id="{E166214C-AC9D-4514-ABF6-A88893E4B5F5}" type="datetimeFigureOut">
               <a:rPr lang="zh-TW" altLang="en-US" smtClean="0"/>
-              <a:t>2015/4/14</a:t>
+              <a:t>2015/5/13</a:t>
             </a:fld>
             <a:endParaRPr lang="zh-TW" altLang="en-US"/>
           </a:p>
@@ -2115,7 +2115,7 @@
           <a:p>
             <a:fld id="{E166214C-AC9D-4514-ABF6-A88893E4B5F5}" type="datetimeFigureOut">
               <a:rPr lang="zh-TW" altLang="en-US" smtClean="0"/>
-              <a:t>2015/4/14</a:t>
+              <a:t>2015/5/13</a:t>
             </a:fld>
             <a:endParaRPr lang="zh-TW" altLang="en-US"/>
           </a:p>
@@ -2368,7 +2368,7 @@
           <a:p>
             <a:fld id="{E166214C-AC9D-4514-ABF6-A88893E4B5F5}" type="datetimeFigureOut">
               <a:rPr lang="zh-TW" altLang="en-US" smtClean="0"/>
-              <a:t>2015/4/14</a:t>
+              <a:t>2015/5/13</a:t>
             </a:fld>
             <a:endParaRPr lang="zh-TW" altLang="en-US"/>
           </a:p>
@@ -2581,7 +2581,7 @@
           <a:p>
             <a:fld id="{E166214C-AC9D-4514-ABF6-A88893E4B5F5}" type="datetimeFigureOut">
               <a:rPr lang="zh-TW" altLang="en-US" smtClean="0"/>
-              <a:t>2015/4/14</a:t>
+              <a:t>2015/5/13</a:t>
             </a:fld>
             <a:endParaRPr lang="zh-TW" altLang="en-US"/>
           </a:p>
@@ -3130,14 +3130,13 @@
           <a:p>
             <a:r>
               <a:rPr lang="en-US" altLang="zh-TW" dirty="0" smtClean="0"/>
-              <a:t>Teaching assistance question</a:t>
-            </a:r>
-          </a:p>
-          <a:p>
+              <a:t>Teaching assistance </a:t>
+            </a:r>
+            <a:r>
+              <a:rPr lang="en-US" altLang="zh-TW" dirty="0" smtClean="0"/>
+              <a:t>question</a:t>
+            </a:r>
             <a:endParaRPr lang="en-US" altLang="zh-TW" dirty="0" smtClean="0"/>
-          </a:p>
-          <a:p>
-            <a:endParaRPr lang="zh-TW" altLang="en-US" dirty="0"/>
           </a:p>
         </p:txBody>
       </p:sp>
@@ -3197,11 +3196,7 @@
             </a:br>
             <a:r>
               <a:rPr lang="en-US" altLang="zh-TW" dirty="0" smtClean="0"/>
-              <a:t>Flow </a:t>
-            </a:r>
-            <a:r>
-              <a:rPr lang="en-US" altLang="zh-TW" dirty="0" smtClean="0"/>
-              <a:t>diagram</a:t>
+              <a:t>Flow diagram</a:t>
             </a:r>
             <a:endParaRPr lang="zh-TW" altLang="en-US" dirty="0"/>
           </a:p>

</xml_diff>